<commit_message>
logo color modification + intermidate demo update
</commit_message>
<xml_diff>
--- a/Verslagen/intermediatedemo.pptx
+++ b/Verslagen/intermediatedemo.pptx
@@ -113,7 +113,7 @@
   </p:defaultTextStyle>
   <p:extLst>
     <p:ext uri="{EFAFB233-063F-42B5-8137-9DF3F51BA10A}">
-      <p15:sldGuideLst xmlns="" xmlns:p15="http://schemas.microsoft.com/office/powerpoint/2012/main">
+      <p15:sldGuideLst xmlns:p15="http://schemas.microsoft.com/office/powerpoint/2012/main" xmlns="">
         <p15:guide id="1" orient="horz" pos="2160">
           <p15:clr>
             <a:srgbClr val="A4A3A4"/>
@@ -1307,25 +1307,25 @@
     </dgm:pt>
   </dgm:ptLst>
   <dgm:cxnLst>
+    <dgm:cxn modelId="{3E6931BD-56DC-445E-B034-1F0A9324CEF5}" type="presOf" srcId="{DD4D1D16-CBD2-43EE-A7C9-814070E34D3A}" destId="{89372812-2771-4395-9F3B-247111C80A40}" srcOrd="1" destOrd="0" presId="urn:microsoft.com/office/officeart/2005/8/layout/hierarchy2"/>
+    <dgm:cxn modelId="{12350B6C-4924-4064-BA0D-D6DAE6DD3551}" type="presOf" srcId="{DD4D1D16-CBD2-43EE-A7C9-814070E34D3A}" destId="{67F8769C-B753-45D8-B0B1-EC206E48ED9F}" srcOrd="0" destOrd="0" presId="urn:microsoft.com/office/officeart/2005/8/layout/hierarchy2"/>
+    <dgm:cxn modelId="{302FEF1B-2DB6-4BCC-82E0-49245D471E4B}" type="presOf" srcId="{15BB76D7-2BDA-4EDE-8F73-9D4BB2CD4971}" destId="{30A78D99-01E9-4FD6-B365-8A0A655DF402}" srcOrd="0" destOrd="0" presId="urn:microsoft.com/office/officeart/2005/8/layout/hierarchy2"/>
+    <dgm:cxn modelId="{EE2626C9-1E79-40BD-943C-4ADAE9826321}" type="presOf" srcId="{D6591959-5F0F-489A-8468-D242C17A36C8}" destId="{C79BEA28-5F21-4532-9188-1C7ABAA70D8F}" srcOrd="0" destOrd="0" presId="urn:microsoft.com/office/officeart/2005/8/layout/hierarchy2"/>
+    <dgm:cxn modelId="{E294910F-1EC7-43F8-972B-8CC0404A3C30}" type="presOf" srcId="{1C0E55F7-5FB2-4E48-8149-913E77520486}" destId="{D50786B4-76D4-4E84-96A2-43CA01A74DF8}" srcOrd="0" destOrd="0" presId="urn:microsoft.com/office/officeart/2005/8/layout/hierarchy2"/>
+    <dgm:cxn modelId="{41511535-6B13-46C2-A701-A47E7FA6CA61}" type="presOf" srcId="{8532AD7D-7EE2-4007-A3F5-FD348991FF6F}" destId="{6ADDB12E-F225-4DAA-8EEF-D28B268A5EC0}" srcOrd="0" destOrd="0" presId="urn:microsoft.com/office/officeart/2005/8/layout/hierarchy2"/>
+    <dgm:cxn modelId="{27AF9362-E21F-451C-A964-D53F36723BDA}" srcId="{276A363E-C704-4D52-9F85-35548A6AA593}" destId="{D6591959-5F0F-489A-8468-D242C17A36C8}" srcOrd="0" destOrd="0" parTransId="{779B853E-8E32-480B-8726-6D7F90F79F45}" sibTransId="{11B1830F-1949-43B7-A28A-33CB04060664}"/>
+    <dgm:cxn modelId="{026A628E-BCB1-47DE-AF6D-036DA013FFD5}" type="presOf" srcId="{F82C1CBE-91A2-4EF8-A552-08262AC94C07}" destId="{4EB53B17-163D-4E4E-99AA-789A7AB458C4}" srcOrd="0" destOrd="0" presId="urn:microsoft.com/office/officeart/2005/8/layout/hierarchy2"/>
+    <dgm:cxn modelId="{EBDF1461-CA97-4833-A590-8DD626B23D7E}" type="presOf" srcId="{779B853E-8E32-480B-8726-6D7F90F79F45}" destId="{26C445C5-4FF3-4917-9A53-77D0B357F9B8}" srcOrd="1" destOrd="0" presId="urn:microsoft.com/office/officeart/2005/8/layout/hierarchy2"/>
+    <dgm:cxn modelId="{40D62DF1-BF91-4B62-9E0E-3628428104F0}" srcId="{1C0E55F7-5FB2-4E48-8149-913E77520486}" destId="{8532AD7D-7EE2-4007-A3F5-FD348991FF6F}" srcOrd="1" destOrd="0" parTransId="{DD4D1D16-CBD2-43EE-A7C9-814070E34D3A}" sibTransId="{C4059019-8137-4DB8-AF28-E6FFB55C576F}"/>
+    <dgm:cxn modelId="{A587323E-FBE6-426F-8637-91A927CE26F2}" type="presOf" srcId="{276A363E-C704-4D52-9F85-35548A6AA593}" destId="{AA82381F-3358-4A1A-9B68-C283C04A3CEB}" srcOrd="0" destOrd="0" presId="urn:microsoft.com/office/officeart/2005/8/layout/hierarchy2"/>
+    <dgm:cxn modelId="{AF24CD37-0DF9-45C0-AF15-642EC0DAA77E}" srcId="{8532AD7D-7EE2-4007-A3F5-FD348991FF6F}" destId="{15BB76D7-2BDA-4EDE-8F73-9D4BB2CD4971}" srcOrd="0" destOrd="0" parTransId="{F82C1CBE-91A2-4EF8-A552-08262AC94C07}" sibTransId="{444924F7-DEC1-4773-8E01-3AA584BF6495}"/>
+    <dgm:cxn modelId="{DA2A0E92-B307-48E4-B1C2-C75EED2E8CD2}" type="presOf" srcId="{F82C1CBE-91A2-4EF8-A552-08262AC94C07}" destId="{1A7D3E5A-6333-4372-90E5-93AD86B30A4A}" srcOrd="1" destOrd="0" presId="urn:microsoft.com/office/officeart/2005/8/layout/hierarchy2"/>
     <dgm:cxn modelId="{B421108B-6A37-46D2-8F4E-7F31E0A9D32F}" srcId="{58034E90-686B-4E9C-8AEB-2433A1E08532}" destId="{1C0E55F7-5FB2-4E48-8149-913E77520486}" srcOrd="0" destOrd="0" parTransId="{250126AC-706A-4CAF-AFC6-19E3D386D61D}" sibTransId="{138B2F27-93A1-4B70-8DBB-133DAC434903}"/>
     <dgm:cxn modelId="{21BD81D8-CC54-4DF9-9E22-187FF8B3E52E}" type="presOf" srcId="{C9578D12-980E-4D95-810E-BC0A9848635E}" destId="{4F19358C-CCDF-4C4F-862A-0F4BA4AA4FD2}" srcOrd="1" destOrd="0" presId="urn:microsoft.com/office/officeart/2005/8/layout/hierarchy2"/>
-    <dgm:cxn modelId="{12350B6C-4924-4064-BA0D-D6DAE6DD3551}" type="presOf" srcId="{DD4D1D16-CBD2-43EE-A7C9-814070E34D3A}" destId="{67F8769C-B753-45D8-B0B1-EC206E48ED9F}" srcOrd="0" destOrd="0" presId="urn:microsoft.com/office/officeart/2005/8/layout/hierarchy2"/>
     <dgm:cxn modelId="{CE40A55A-ECFD-4168-91EE-B8C494101F3E}" srcId="{1C0E55F7-5FB2-4E48-8149-913E77520486}" destId="{276A363E-C704-4D52-9F85-35548A6AA593}" srcOrd="0" destOrd="0" parTransId="{C9578D12-980E-4D95-810E-BC0A9848635E}" sibTransId="{329C8A27-588C-434B-A7D9-B1144CC485D6}"/>
     <dgm:cxn modelId="{83AE0AC5-BF21-492B-8AC5-0EDD38FBDEE3}" type="presOf" srcId="{58034E90-686B-4E9C-8AEB-2433A1E08532}" destId="{6F16B71C-2660-4279-AAE8-8E2A2C798710}" srcOrd="0" destOrd="0" presId="urn:microsoft.com/office/officeart/2005/8/layout/hierarchy2"/>
-    <dgm:cxn modelId="{302FEF1B-2DB6-4BCC-82E0-49245D471E4B}" type="presOf" srcId="{15BB76D7-2BDA-4EDE-8F73-9D4BB2CD4971}" destId="{30A78D99-01E9-4FD6-B365-8A0A655DF402}" srcOrd="0" destOrd="0" presId="urn:microsoft.com/office/officeart/2005/8/layout/hierarchy2"/>
-    <dgm:cxn modelId="{DA2A0E92-B307-48E4-B1C2-C75EED2E8CD2}" type="presOf" srcId="{F82C1CBE-91A2-4EF8-A552-08262AC94C07}" destId="{1A7D3E5A-6333-4372-90E5-93AD86B30A4A}" srcOrd="1" destOrd="0" presId="urn:microsoft.com/office/officeart/2005/8/layout/hierarchy2"/>
-    <dgm:cxn modelId="{AF24CD37-0DF9-45C0-AF15-642EC0DAA77E}" srcId="{8532AD7D-7EE2-4007-A3F5-FD348991FF6F}" destId="{15BB76D7-2BDA-4EDE-8F73-9D4BB2CD4971}" srcOrd="0" destOrd="0" parTransId="{F82C1CBE-91A2-4EF8-A552-08262AC94C07}" sibTransId="{444924F7-DEC1-4773-8E01-3AA584BF6495}"/>
-    <dgm:cxn modelId="{3E6931BD-56DC-445E-B034-1F0A9324CEF5}" type="presOf" srcId="{DD4D1D16-CBD2-43EE-A7C9-814070E34D3A}" destId="{89372812-2771-4395-9F3B-247111C80A40}" srcOrd="1" destOrd="0" presId="urn:microsoft.com/office/officeart/2005/8/layout/hierarchy2"/>
+    <dgm:cxn modelId="{004107B0-E35A-4CCF-B519-AEECD9E23E42}" type="presOf" srcId="{C9578D12-980E-4D95-810E-BC0A9848635E}" destId="{2DF3C455-C390-4894-945C-5945CEDF0695}" srcOrd="0" destOrd="0" presId="urn:microsoft.com/office/officeart/2005/8/layout/hierarchy2"/>
     <dgm:cxn modelId="{88AF8D27-2832-44C2-BCEA-7D5075880880}" type="presOf" srcId="{779B853E-8E32-480B-8726-6D7F90F79F45}" destId="{6CBF796B-60DB-48FC-99B1-668282A960CE}" srcOrd="0" destOrd="0" presId="urn:microsoft.com/office/officeart/2005/8/layout/hierarchy2"/>
-    <dgm:cxn modelId="{026A628E-BCB1-47DE-AF6D-036DA013FFD5}" type="presOf" srcId="{F82C1CBE-91A2-4EF8-A552-08262AC94C07}" destId="{4EB53B17-163D-4E4E-99AA-789A7AB458C4}" srcOrd="0" destOrd="0" presId="urn:microsoft.com/office/officeart/2005/8/layout/hierarchy2"/>
-    <dgm:cxn modelId="{004107B0-E35A-4CCF-B519-AEECD9E23E42}" type="presOf" srcId="{C9578D12-980E-4D95-810E-BC0A9848635E}" destId="{2DF3C455-C390-4894-945C-5945CEDF0695}" srcOrd="0" destOrd="0" presId="urn:microsoft.com/office/officeart/2005/8/layout/hierarchy2"/>
-    <dgm:cxn modelId="{A587323E-FBE6-426F-8637-91A927CE26F2}" type="presOf" srcId="{276A363E-C704-4D52-9F85-35548A6AA593}" destId="{AA82381F-3358-4A1A-9B68-C283C04A3CEB}" srcOrd="0" destOrd="0" presId="urn:microsoft.com/office/officeart/2005/8/layout/hierarchy2"/>
-    <dgm:cxn modelId="{27AF9362-E21F-451C-A964-D53F36723BDA}" srcId="{276A363E-C704-4D52-9F85-35548A6AA593}" destId="{D6591959-5F0F-489A-8468-D242C17A36C8}" srcOrd="0" destOrd="0" parTransId="{779B853E-8E32-480B-8726-6D7F90F79F45}" sibTransId="{11B1830F-1949-43B7-A28A-33CB04060664}"/>
-    <dgm:cxn modelId="{EE2626C9-1E79-40BD-943C-4ADAE9826321}" type="presOf" srcId="{D6591959-5F0F-489A-8468-D242C17A36C8}" destId="{C79BEA28-5F21-4532-9188-1C7ABAA70D8F}" srcOrd="0" destOrd="0" presId="urn:microsoft.com/office/officeart/2005/8/layout/hierarchy2"/>
-    <dgm:cxn modelId="{EBDF1461-CA97-4833-A590-8DD626B23D7E}" type="presOf" srcId="{779B853E-8E32-480B-8726-6D7F90F79F45}" destId="{26C445C5-4FF3-4917-9A53-77D0B357F9B8}" srcOrd="1" destOrd="0" presId="urn:microsoft.com/office/officeart/2005/8/layout/hierarchy2"/>
-    <dgm:cxn modelId="{E294910F-1EC7-43F8-972B-8CC0404A3C30}" type="presOf" srcId="{1C0E55F7-5FB2-4E48-8149-913E77520486}" destId="{D50786B4-76D4-4E84-96A2-43CA01A74DF8}" srcOrd="0" destOrd="0" presId="urn:microsoft.com/office/officeart/2005/8/layout/hierarchy2"/>
-    <dgm:cxn modelId="{40D62DF1-BF91-4B62-9E0E-3628428104F0}" srcId="{1C0E55F7-5FB2-4E48-8149-913E77520486}" destId="{8532AD7D-7EE2-4007-A3F5-FD348991FF6F}" srcOrd="1" destOrd="0" parTransId="{DD4D1D16-CBD2-43EE-A7C9-814070E34D3A}" sibTransId="{C4059019-8137-4DB8-AF28-E6FFB55C576F}"/>
-    <dgm:cxn modelId="{41511535-6B13-46C2-A701-A47E7FA6CA61}" type="presOf" srcId="{8532AD7D-7EE2-4007-A3F5-FD348991FF6F}" destId="{6ADDB12E-F225-4DAA-8EEF-D28B268A5EC0}" srcOrd="0" destOrd="0" presId="urn:microsoft.com/office/officeart/2005/8/layout/hierarchy2"/>
     <dgm:cxn modelId="{3042C3FA-3646-497C-9376-7B65F4B1358F}" type="presParOf" srcId="{6F16B71C-2660-4279-AAE8-8E2A2C798710}" destId="{D55107E7-7B18-47C9-BBE5-4FFDE439A139}" srcOrd="0" destOrd="0" presId="urn:microsoft.com/office/officeart/2005/8/layout/hierarchy2"/>
     <dgm:cxn modelId="{7298C79F-0696-4CE0-A41A-EE8BFBC57104}" type="presParOf" srcId="{D55107E7-7B18-47C9-BBE5-4FFDE439A139}" destId="{D50786B4-76D4-4E84-96A2-43CA01A74DF8}" srcOrd="0" destOrd="0" presId="urn:microsoft.com/office/officeart/2005/8/layout/hierarchy2"/>
     <dgm:cxn modelId="{0043B9F3-1E8A-47C0-B041-D9E830E3EB68}" type="presParOf" srcId="{D55107E7-7B18-47C9-BBE5-4FFDE439A139}" destId="{19399A10-7F5B-467B-82D0-2BB2693584D2}" srcOrd="1" destOrd="0" presId="urn:microsoft.com/office/officeart/2005/8/layout/hierarchy2"/>
@@ -7783,14 +7783,12 @@
               <a:rPr lang="nl-BE" dirty="0" smtClean="0"/>
               <a:t>Temperature </a:t>
             </a:r>
-            <a:endParaRPr lang="nl-BE" dirty="0" smtClean="0"/>
           </a:p>
           <a:p>
             <a:r>
               <a:rPr lang="nl-BE" dirty="0" smtClean="0"/>
               <a:t>Humidity </a:t>
             </a:r>
-            <a:endParaRPr lang="nl-BE" dirty="0" smtClean="0"/>
           </a:p>
           <a:p>
             <a:r>
@@ -7874,7 +7872,6 @@
               <a:rPr lang="nl-NL" sz="2000" dirty="0"/>
               <a:t>Environment </a:t>
             </a:r>
-            <a:endParaRPr lang="nl-NL" sz="2000" dirty="0"/>
           </a:p>
         </p:txBody>
       </p:sp>
@@ -8084,33 +8081,21 @@
             <a:pPr lvl="1"/>
             <a:r>
               <a:rPr lang="nl-BE" dirty="0" smtClean="0"/>
-              <a:t>Harder </a:t>
-            </a:r>
+              <a:t>Harder to test without perfect data</a:t>
+            </a:r>
+          </a:p>
+          <a:p>
+            <a:pPr lvl="1"/>
             <a:r>
               <a:rPr lang="nl-BE" dirty="0" smtClean="0"/>
-              <a:t>to test without perfect data</a:t>
+              <a:t>Website slow, froze a couple of times</a:t>
             </a:r>
           </a:p>
           <a:p>
             <a:pPr lvl="1"/>
             <a:r>
               <a:rPr lang="nl-BE" dirty="0" smtClean="0"/>
-              <a:t>Website </a:t>
-            </a:r>
-            <a:r>
-              <a:rPr lang="nl-BE" dirty="0" smtClean="0"/>
-              <a:t>slow, froze a couple of times</a:t>
-            </a:r>
-          </a:p>
-          <a:p>
-            <a:pPr lvl="1"/>
-            <a:r>
-              <a:rPr lang="nl-BE" dirty="0" smtClean="0"/>
-              <a:t>Speed plot not accurate at </a:t>
-            </a:r>
-            <a:r>
-              <a:rPr lang="nl-BE" dirty="0" smtClean="0"/>
-              <a:t>first</a:t>
+              <a:t>Speed plot not accurate at first</a:t>
             </a:r>
             <a:endParaRPr lang="nl-BE" dirty="0"/>
           </a:p>
@@ -8201,11 +8186,7 @@
           <a:p>
             <a:r>
               <a:rPr lang="nl-BE" dirty="0" smtClean="0"/>
-              <a:t>Expected and current </a:t>
-            </a:r>
-            <a:r>
-              <a:rPr lang="nl-BE" dirty="0" smtClean="0"/>
-              <a:t>problems</a:t>
+              <a:t>Expected and current problems</a:t>
             </a:r>
             <a:endParaRPr lang="nl-BE" dirty="0"/>
           </a:p>

</xml_diff>